<commit_message>
programming complete, commit allowing editing across multiple devices
</commit_message>
<xml_diff>
--- a/assets/diagrams.pptx
+++ b/assets/diagrams.pptx
@@ -225,7 +225,7 @@
           <a:p>
             <a:fld id="{E90CDB62-1D6E-D545-843F-F79DABE7A985}" type="datetimeFigureOut">
               <a:rPr lang="en-US" smtClean="0"/>
-              <a:t>12/12/23</a:t>
+              <a:t>1/3/24</a:t>
             </a:fld>
             <a:endParaRPr lang="en-US"/>
           </a:p>
@@ -810,7 +810,7 @@
           <a:p>
             <a:fld id="{FEDB6D76-5F38-E94A-AB48-092728365E3A}" type="datetimeFigureOut">
               <a:rPr lang="en-US" smtClean="0"/>
-              <a:t>12/12/23</a:t>
+              <a:t>1/3/24</a:t>
             </a:fld>
             <a:endParaRPr lang="en-US"/>
           </a:p>
@@ -1010,7 +1010,7 @@
           <a:p>
             <a:fld id="{FEDB6D76-5F38-E94A-AB48-092728365E3A}" type="datetimeFigureOut">
               <a:rPr lang="en-US" smtClean="0"/>
-              <a:t>12/12/23</a:t>
+              <a:t>1/3/24</a:t>
             </a:fld>
             <a:endParaRPr lang="en-US"/>
           </a:p>
@@ -1220,7 +1220,7 @@
           <a:p>
             <a:fld id="{FEDB6D76-5F38-E94A-AB48-092728365E3A}" type="datetimeFigureOut">
               <a:rPr lang="en-US" smtClean="0"/>
-              <a:t>12/12/23</a:t>
+              <a:t>1/3/24</a:t>
             </a:fld>
             <a:endParaRPr lang="en-US"/>
           </a:p>
@@ -1420,7 +1420,7 @@
           <a:p>
             <a:fld id="{FEDB6D76-5F38-E94A-AB48-092728365E3A}" type="datetimeFigureOut">
               <a:rPr lang="en-US" smtClean="0"/>
-              <a:t>12/12/23</a:t>
+              <a:t>1/3/24</a:t>
             </a:fld>
             <a:endParaRPr lang="en-US"/>
           </a:p>
@@ -1696,7 +1696,7 @@
           <a:p>
             <a:fld id="{FEDB6D76-5F38-E94A-AB48-092728365E3A}" type="datetimeFigureOut">
               <a:rPr lang="en-US" smtClean="0"/>
-              <a:t>12/12/23</a:t>
+              <a:t>1/3/24</a:t>
             </a:fld>
             <a:endParaRPr lang="en-US"/>
           </a:p>
@@ -1964,7 +1964,7 @@
           <a:p>
             <a:fld id="{FEDB6D76-5F38-E94A-AB48-092728365E3A}" type="datetimeFigureOut">
               <a:rPr lang="en-US" smtClean="0"/>
-              <a:t>12/12/23</a:t>
+              <a:t>1/3/24</a:t>
             </a:fld>
             <a:endParaRPr lang="en-US"/>
           </a:p>
@@ -2379,7 +2379,7 @@
           <a:p>
             <a:fld id="{FEDB6D76-5F38-E94A-AB48-092728365E3A}" type="datetimeFigureOut">
               <a:rPr lang="en-US" smtClean="0"/>
-              <a:t>12/12/23</a:t>
+              <a:t>1/3/24</a:t>
             </a:fld>
             <a:endParaRPr lang="en-US"/>
           </a:p>
@@ -2521,7 +2521,7 @@
           <a:p>
             <a:fld id="{FEDB6D76-5F38-E94A-AB48-092728365E3A}" type="datetimeFigureOut">
               <a:rPr lang="en-US" smtClean="0"/>
-              <a:t>12/12/23</a:t>
+              <a:t>1/3/24</a:t>
             </a:fld>
             <a:endParaRPr lang="en-US"/>
           </a:p>
@@ -2634,7 +2634,7 @@
           <a:p>
             <a:fld id="{FEDB6D76-5F38-E94A-AB48-092728365E3A}" type="datetimeFigureOut">
               <a:rPr lang="en-US" smtClean="0"/>
-              <a:t>12/12/23</a:t>
+              <a:t>1/3/24</a:t>
             </a:fld>
             <a:endParaRPr lang="en-US"/>
           </a:p>
@@ -2947,7 +2947,7 @@
           <a:p>
             <a:fld id="{FEDB6D76-5F38-E94A-AB48-092728365E3A}" type="datetimeFigureOut">
               <a:rPr lang="en-US" smtClean="0"/>
-              <a:t>12/12/23</a:t>
+              <a:t>1/3/24</a:t>
             </a:fld>
             <a:endParaRPr lang="en-US"/>
           </a:p>
@@ -3236,7 +3236,7 @@
           <a:p>
             <a:fld id="{FEDB6D76-5F38-E94A-AB48-092728365E3A}" type="datetimeFigureOut">
               <a:rPr lang="en-US" smtClean="0"/>
-              <a:t>12/12/23</a:t>
+              <a:t>1/3/24</a:t>
             </a:fld>
             <a:endParaRPr lang="en-US"/>
           </a:p>
@@ -3479,7 +3479,7 @@
           <a:p>
             <a:fld id="{FEDB6D76-5F38-E94A-AB48-092728365E3A}" type="datetimeFigureOut">
               <a:rPr lang="en-US" smtClean="0"/>
-              <a:t>12/12/23</a:t>
+              <a:t>1/3/24</a:t>
             </a:fld>
             <a:endParaRPr lang="en-US"/>
           </a:p>
@@ -21465,7 +21465,7 @@
         <p:spPr>
           <a:xfrm>
             <a:off x="2272568" y="1515940"/>
-            <a:ext cx="1702065" cy="980458"/>
+            <a:ext cx="1095665" cy="620977"/>
           </a:xfrm>
           <a:prstGeom prst="roundRect">
             <a:avLst/>
@@ -21516,9 +21516,245 @@
                 <a:latin typeface="Consolas" panose="020B0609020204030204" pitchFamily="49" charset="0"/>
                 <a:cs typeface="Consolas" panose="020B0609020204030204" pitchFamily="49" charset="0"/>
               </a:rPr>
-              <a:t>condition</a:t>
+              <a:t>calle</a:t>
             </a:r>
           </a:p>
+        </p:txBody>
+      </p:sp>
+      <p:sp>
+        <p:nvSpPr>
+          <p:cNvPr id="22" name="Rounded Rectangle 21">
+            <a:extLst>
+              <a:ext uri="{FF2B5EF4-FFF2-40B4-BE49-F238E27FC236}">
+                <a16:creationId xmlns:a16="http://schemas.microsoft.com/office/drawing/2014/main" id="{DD5012EC-4BC6-547E-A05E-5CA62D9FAEE2}"/>
+              </a:ext>
+            </a:extLst>
+          </p:cNvPr>
+          <p:cNvSpPr/>
+          <p:nvPr/>
+        </p:nvSpPr>
+        <p:spPr>
+          <a:xfrm>
+            <a:off x="2187752" y="1387367"/>
+            <a:ext cx="972138" cy="322544"/>
+          </a:xfrm>
+          <a:prstGeom prst="roundRect">
+            <a:avLst/>
+          </a:prstGeom>
+          <a:solidFill>
+            <a:schemeClr val="accent2">
+              <a:lumMod val="60000"/>
+              <a:lumOff val="40000"/>
+            </a:schemeClr>
+          </a:solidFill>
+          <a:ln w="28575">
+            <a:solidFill>
+              <a:schemeClr val="bg2">
+                <a:lumMod val="10000"/>
+              </a:schemeClr>
+            </a:solidFill>
+          </a:ln>
+        </p:spPr>
+        <p:style>
+          <a:lnRef idx="2">
+            <a:schemeClr val="accent1">
+              <a:shade val="15000"/>
+            </a:schemeClr>
+          </a:lnRef>
+          <a:fillRef idx="1">
+            <a:schemeClr val="accent1"/>
+          </a:fillRef>
+          <a:effectRef idx="0">
+            <a:schemeClr val="accent1"/>
+          </a:effectRef>
+          <a:fontRef idx="minor">
+            <a:schemeClr val="lt1"/>
+          </a:fontRef>
+        </p:style>
+        <p:txBody>
+          <a:bodyPr rtlCol="0" anchor="ctr"/>
+          <a:lstStyle/>
+          <a:p>
+            <a:pPr algn="ctr"/>
+            <a:r>
+              <a:rPr lang="en-US" sz="2000" dirty="0">
+                <a:solidFill>
+                  <a:schemeClr val="bg2">
+                    <a:lumMod val="10000"/>
+                  </a:schemeClr>
+                </a:solidFill>
+                <a:latin typeface="Consolas" panose="020B0609020204030204" pitchFamily="49" charset="0"/>
+                <a:cs typeface="Consolas" panose="020B0609020204030204" pitchFamily="49" charset="0"/>
+              </a:rPr>
+              <a:t>Call</a:t>
+            </a:r>
+          </a:p>
+        </p:txBody>
+      </p:sp>
+      <p:cxnSp>
+        <p:nvCxnSpPr>
+          <p:cNvPr id="25" name="Straight Arrow Connector 24">
+            <a:extLst>
+              <a:ext uri="{FF2B5EF4-FFF2-40B4-BE49-F238E27FC236}">
+                <a16:creationId xmlns:a16="http://schemas.microsoft.com/office/drawing/2014/main" id="{9F78C782-D344-91F1-A1ED-A08C9AB95E3D}"/>
+              </a:ext>
+            </a:extLst>
+          </p:cNvPr>
+          <p:cNvCxnSpPr>
+            <a:cxnSpLocks/>
+          </p:cNvCxnSpPr>
+          <p:nvPr/>
+        </p:nvCxnSpPr>
+        <p:spPr>
+          <a:xfrm>
+            <a:off x="3159890" y="1905907"/>
+            <a:ext cx="475479" cy="0"/>
+          </a:xfrm>
+          <a:prstGeom prst="straightConnector1">
+            <a:avLst/>
+          </a:prstGeom>
+          <a:ln w="38100">
+            <a:solidFill>
+              <a:schemeClr val="tx1"/>
+            </a:solidFill>
+            <a:tailEnd type="triangle"/>
+          </a:ln>
+        </p:spPr>
+        <p:style>
+          <a:lnRef idx="1">
+            <a:schemeClr val="accent1"/>
+          </a:lnRef>
+          <a:fillRef idx="0">
+            <a:schemeClr val="accent1"/>
+          </a:fillRef>
+          <a:effectRef idx="0">
+            <a:schemeClr val="accent1"/>
+          </a:effectRef>
+          <a:fontRef idx="minor">
+            <a:schemeClr val="tx1"/>
+          </a:fontRef>
+        </p:style>
+      </p:cxnSp>
+      <p:sp>
+        <p:nvSpPr>
+          <p:cNvPr id="5" name="Rounded Rectangle 4">
+            <a:extLst>
+              <a:ext uri="{FF2B5EF4-FFF2-40B4-BE49-F238E27FC236}">
+                <a16:creationId xmlns:a16="http://schemas.microsoft.com/office/drawing/2014/main" id="{9F5DF86F-FECF-B16C-F1E8-EC16E8879996}"/>
+              </a:ext>
+            </a:extLst>
+          </p:cNvPr>
+          <p:cNvSpPr/>
+          <p:nvPr/>
+        </p:nvSpPr>
+        <p:spPr>
+          <a:xfrm>
+            <a:off x="5070523" y="2113219"/>
+            <a:ext cx="1681382" cy="322544"/>
+          </a:xfrm>
+          <a:prstGeom prst="roundRect">
+            <a:avLst/>
+          </a:prstGeom>
+          <a:solidFill>
+            <a:schemeClr val="accent3">
+              <a:lumMod val="60000"/>
+              <a:lumOff val="40000"/>
+            </a:schemeClr>
+          </a:solidFill>
+          <a:ln w="28575">
+            <a:solidFill>
+              <a:schemeClr val="bg2">
+                <a:lumMod val="10000"/>
+              </a:schemeClr>
+            </a:solidFill>
+          </a:ln>
+        </p:spPr>
+        <p:style>
+          <a:lnRef idx="2">
+            <a:schemeClr val="accent1">
+              <a:shade val="15000"/>
+            </a:schemeClr>
+          </a:lnRef>
+          <a:fillRef idx="1">
+            <a:schemeClr val="accent1"/>
+          </a:fillRef>
+          <a:effectRef idx="0">
+            <a:schemeClr val="accent1"/>
+          </a:effectRef>
+          <a:fontRef idx="minor">
+            <a:schemeClr val="lt1"/>
+          </a:fontRef>
+        </p:style>
+        <p:txBody>
+          <a:bodyPr rtlCol="0" anchor="ctr"/>
+          <a:lstStyle/>
+          <a:p>
+            <a:pPr algn="ctr"/>
+            <a:r>
+              <a:rPr lang="en-US" sz="2000" dirty="0">
+                <a:solidFill>
+                  <a:schemeClr val="bg2">
+                    <a:lumMod val="10000"/>
+                  </a:schemeClr>
+                </a:solidFill>
+                <a:latin typeface="Consolas" panose="020B0609020204030204" pitchFamily="49" charset="0"/>
+                <a:cs typeface="Consolas" panose="020B0609020204030204" pitchFamily="49" charset="0"/>
+              </a:rPr>
+              <a:t>Identifier</a:t>
+            </a:r>
+          </a:p>
+        </p:txBody>
+      </p:sp>
+      <p:sp>
+        <p:nvSpPr>
+          <p:cNvPr id="3" name="Rounded Rectangle 2">
+            <a:extLst>
+              <a:ext uri="{FF2B5EF4-FFF2-40B4-BE49-F238E27FC236}">
+                <a16:creationId xmlns:a16="http://schemas.microsoft.com/office/drawing/2014/main" id="{3FC865FE-C461-7CEB-2140-45823F89584F}"/>
+              </a:ext>
+            </a:extLst>
+          </p:cNvPr>
+          <p:cNvSpPr/>
+          <p:nvPr/>
+        </p:nvSpPr>
+        <p:spPr>
+          <a:xfrm>
+            <a:off x="3707722" y="1884524"/>
+            <a:ext cx="1095665" cy="620977"/>
+          </a:xfrm>
+          <a:prstGeom prst="roundRect">
+            <a:avLst/>
+          </a:prstGeom>
+          <a:solidFill>
+            <a:schemeClr val="bg1"/>
+          </a:solidFill>
+          <a:ln w="28575">
+            <a:solidFill>
+              <a:schemeClr val="bg2">
+                <a:lumMod val="10000"/>
+              </a:schemeClr>
+            </a:solidFill>
+          </a:ln>
+        </p:spPr>
+        <p:style>
+          <a:lnRef idx="2">
+            <a:schemeClr val="accent1">
+              <a:shade val="15000"/>
+            </a:schemeClr>
+          </a:lnRef>
+          <a:fillRef idx="1">
+            <a:schemeClr val="accent1"/>
+          </a:fillRef>
+          <a:effectRef idx="0">
+            <a:schemeClr val="accent1"/>
+          </a:effectRef>
+          <a:fontRef idx="minor">
+            <a:schemeClr val="lt1"/>
+          </a:fontRef>
+        </p:style>
+        <p:txBody>
+          <a:bodyPr rtlCol="0" anchor="ctr"/>
+          <a:lstStyle/>
           <a:p>
             <a:pPr>
               <a:lnSpc>
@@ -21535,17 +21771,17 @@
                 <a:latin typeface="Consolas" panose="020B0609020204030204" pitchFamily="49" charset="0"/>
                 <a:cs typeface="Consolas" panose="020B0609020204030204" pitchFamily="49" charset="0"/>
               </a:rPr>
-              <a:t>contents[]</a:t>
+              <a:t>calle</a:t>
             </a:r>
           </a:p>
         </p:txBody>
       </p:sp>
       <p:sp>
         <p:nvSpPr>
-          <p:cNvPr id="22" name="Rounded Rectangle 21">
-            <a:extLst>
-              <a:ext uri="{FF2B5EF4-FFF2-40B4-BE49-F238E27FC236}">
-                <a16:creationId xmlns:a16="http://schemas.microsoft.com/office/drawing/2014/main" id="{DD5012EC-4BC6-547E-A05E-5CA62D9FAEE2}"/>
+          <p:cNvPr id="4" name="Rounded Rectangle 3">
+            <a:extLst>
+              <a:ext uri="{FF2B5EF4-FFF2-40B4-BE49-F238E27FC236}">
+                <a16:creationId xmlns:a16="http://schemas.microsoft.com/office/drawing/2014/main" id="{2108102D-23BE-F961-71F9-2966307ECB75}"/>
               </a:ext>
             </a:extLst>
           </p:cNvPr>
@@ -21554,14 +21790,14 @@
         </p:nvSpPr>
         <p:spPr>
           <a:xfrm>
-            <a:off x="2176176" y="1299494"/>
-            <a:ext cx="1326813" cy="322544"/>
+            <a:off x="3622906" y="1755951"/>
+            <a:ext cx="972138" cy="322544"/>
           </a:xfrm>
           <a:prstGeom prst="roundRect">
             <a:avLst/>
           </a:prstGeom>
           <a:solidFill>
-            <a:schemeClr val="accent3">
+            <a:schemeClr val="accent2">
               <a:lumMod val="60000"/>
               <a:lumOff val="40000"/>
             </a:schemeClr>
@@ -21605,202 +21841,17 @@
                 <a:latin typeface="Consolas" panose="020B0609020204030204" pitchFamily="49" charset="0"/>
                 <a:cs typeface="Consolas" panose="020B0609020204030204" pitchFamily="49" charset="0"/>
               </a:rPr>
-              <a:t>While</a:t>
-            </a:r>
-          </a:p>
-        </p:txBody>
-      </p:sp>
-      <p:sp>
-        <p:nvSpPr>
-          <p:cNvPr id="24" name="Rounded Rectangle 23">
-            <a:extLst>
-              <a:ext uri="{FF2B5EF4-FFF2-40B4-BE49-F238E27FC236}">
-                <a16:creationId xmlns:a16="http://schemas.microsoft.com/office/drawing/2014/main" id="{A34F67F3-2652-8CF3-7FD2-DC2911E519B3}"/>
-              </a:ext>
-            </a:extLst>
-          </p:cNvPr>
-          <p:cNvSpPr/>
-          <p:nvPr/>
-        </p:nvSpPr>
-        <p:spPr>
-          <a:xfrm>
-            <a:off x="4175282" y="1709911"/>
-            <a:ext cx="2103073" cy="322544"/>
-          </a:xfrm>
-          <a:prstGeom prst="roundRect">
-            <a:avLst/>
-          </a:prstGeom>
-          <a:solidFill>
-            <a:srgbClr val="F79ED1"/>
-          </a:solidFill>
-          <a:ln w="28575">
-            <a:solidFill>
-              <a:schemeClr val="bg2">
-                <a:lumMod val="10000"/>
-              </a:schemeClr>
-            </a:solidFill>
-          </a:ln>
-        </p:spPr>
-        <p:style>
-          <a:lnRef idx="2">
-            <a:schemeClr val="accent1">
-              <a:shade val="15000"/>
-            </a:schemeClr>
-          </a:lnRef>
-          <a:fillRef idx="1">
-            <a:schemeClr val="accent1"/>
-          </a:fillRef>
-          <a:effectRef idx="0">
-            <a:schemeClr val="accent1"/>
-          </a:effectRef>
-          <a:fontRef idx="minor">
-            <a:schemeClr val="lt1"/>
-          </a:fontRef>
-        </p:style>
-        <p:txBody>
-          <a:bodyPr rtlCol="0" anchor="ctr"/>
-          <a:lstStyle/>
-          <a:p>
-            <a:pPr algn="ctr"/>
-            <a:r>
-              <a:rPr lang="en-US" dirty="0">
-                <a:solidFill>
-                  <a:schemeClr val="bg2">
-                    <a:lumMod val="10000"/>
-                  </a:schemeClr>
-                </a:solidFill>
-                <a:latin typeface="Consolas" panose="020B0609020204030204" pitchFamily="49" charset="0"/>
-                <a:cs typeface="Consolas" panose="020B0609020204030204" pitchFamily="49" charset="0"/>
-              </a:rPr>
-              <a:t>statement_chain</a:t>
+              <a:t>Call</a:t>
             </a:r>
           </a:p>
         </p:txBody>
       </p:sp>
       <p:cxnSp>
         <p:nvCxnSpPr>
-          <p:cNvPr id="25" name="Straight Arrow Connector 24">
-            <a:extLst>
-              <a:ext uri="{FF2B5EF4-FFF2-40B4-BE49-F238E27FC236}">
-                <a16:creationId xmlns:a16="http://schemas.microsoft.com/office/drawing/2014/main" id="{9F78C782-D344-91F1-A1ED-A08C9AB95E3D}"/>
-              </a:ext>
-            </a:extLst>
-          </p:cNvPr>
-          <p:cNvCxnSpPr>
-            <a:cxnSpLocks/>
-            <a:endCxn id="24" idx="1"/>
-          </p:cNvCxnSpPr>
-          <p:nvPr/>
-        </p:nvCxnSpPr>
-        <p:spPr>
-          <a:xfrm>
-            <a:off x="3699803" y="1871183"/>
-            <a:ext cx="475479" cy="0"/>
-          </a:xfrm>
-          <a:prstGeom prst="straightConnector1">
-            <a:avLst/>
-          </a:prstGeom>
-          <a:ln w="38100">
-            <a:solidFill>
-              <a:schemeClr val="tx1"/>
-            </a:solidFill>
-            <a:tailEnd type="triangle"/>
-          </a:ln>
-        </p:spPr>
-        <p:style>
-          <a:lnRef idx="1">
-            <a:schemeClr val="accent1"/>
-          </a:lnRef>
-          <a:fillRef idx="0">
-            <a:schemeClr val="accent1"/>
-          </a:fillRef>
-          <a:effectRef idx="0">
-            <a:schemeClr val="accent1"/>
-          </a:effectRef>
-          <a:fontRef idx="minor">
-            <a:schemeClr val="tx1"/>
-          </a:fontRef>
-        </p:style>
-      </p:cxnSp>
-      <p:sp>
-        <p:nvSpPr>
-          <p:cNvPr id="45" name="Rounded Rectangle 44">
-            <a:extLst>
-              <a:ext uri="{FF2B5EF4-FFF2-40B4-BE49-F238E27FC236}">
-                <a16:creationId xmlns:a16="http://schemas.microsoft.com/office/drawing/2014/main" id="{1A518C79-E0BD-2E02-F9B1-FAE2E9C29ABB}"/>
-              </a:ext>
-            </a:extLst>
-          </p:cNvPr>
-          <p:cNvSpPr/>
-          <p:nvPr/>
-        </p:nvSpPr>
-        <p:spPr>
-          <a:xfrm>
-            <a:off x="4175282" y="2175724"/>
-            <a:ext cx="639048" cy="322544"/>
-          </a:xfrm>
-          <a:prstGeom prst="roundRect">
-            <a:avLst/>
-          </a:prstGeom>
-          <a:solidFill>
-            <a:schemeClr val="accent5">
-              <a:lumMod val="60000"/>
-              <a:lumOff val="40000"/>
-            </a:schemeClr>
-          </a:solidFill>
-          <a:ln w="28575">
-            <a:solidFill>
-              <a:schemeClr val="tx1"/>
-            </a:solidFill>
-          </a:ln>
-        </p:spPr>
-        <p:style>
-          <a:lnRef idx="2">
-            <a:schemeClr val="accent1">
-              <a:shade val="15000"/>
-            </a:schemeClr>
-          </a:lnRef>
-          <a:fillRef idx="1">
-            <a:schemeClr val="accent1"/>
-          </a:fillRef>
-          <a:effectRef idx="0">
-            <a:schemeClr val="accent1"/>
-          </a:effectRef>
-          <a:fontRef idx="minor">
-            <a:schemeClr val="lt1"/>
-          </a:fontRef>
-        </p:style>
-        <p:txBody>
-          <a:bodyPr rtlCol="0" anchor="ctr"/>
-          <a:lstStyle/>
-          <a:p>
-            <a:pPr algn="ctr"/>
-            <a:r>
-              <a:rPr lang="en-US" sz="2000" dirty="0">
-                <a:solidFill>
-                  <a:schemeClr val="tx1"/>
-                </a:solidFill>
-                <a:latin typeface="Consolas" panose="020B0609020204030204" pitchFamily="49" charset="0"/>
-                <a:cs typeface="Consolas" panose="020B0609020204030204" pitchFamily="49" charset="0"/>
-              </a:rPr>
-              <a:t>ast</a:t>
-            </a:r>
-            <a:endParaRPr lang="en-US" sz="3200" dirty="0">
-              <a:solidFill>
-                <a:schemeClr val="tx1"/>
-              </a:solidFill>
-              <a:latin typeface="Consolas" panose="020B0609020204030204" pitchFamily="49" charset="0"/>
-              <a:cs typeface="Consolas" panose="020B0609020204030204" pitchFamily="49" charset="0"/>
-            </a:endParaRPr>
-          </a:p>
-        </p:txBody>
-      </p:sp>
-      <p:cxnSp>
-        <p:nvCxnSpPr>
-          <p:cNvPr id="46" name="Straight Arrow Connector 45">
-            <a:extLst>
-              <a:ext uri="{FF2B5EF4-FFF2-40B4-BE49-F238E27FC236}">
-                <a16:creationId xmlns:a16="http://schemas.microsoft.com/office/drawing/2014/main" id="{F161E46A-B1BA-197C-8A19-82DF78A5BB14}"/>
+          <p:cNvPr id="6" name="Straight Arrow Connector 5">
+            <a:extLst>
+              <a:ext uri="{FF2B5EF4-FFF2-40B4-BE49-F238E27FC236}">
+                <a16:creationId xmlns:a16="http://schemas.microsoft.com/office/drawing/2014/main" id="{D24230BC-3B5E-A2C4-BD04-BBFE8AB81D7B}"/>
               </a:ext>
             </a:extLst>
           </p:cNvPr>
@@ -21811,8 +21862,8 @@
         </p:nvCxnSpPr>
         <p:spPr>
           <a:xfrm>
-            <a:off x="3766470" y="2317592"/>
-            <a:ext cx="408812" cy="0"/>
+            <a:off x="4595044" y="2274491"/>
+            <a:ext cx="475479" cy="0"/>
           </a:xfrm>
           <a:prstGeom prst="straightConnector1">
             <a:avLst/>
@@ -21839,299 +21890,6 @@
           </a:fontRef>
         </p:style>
       </p:cxnSp>
-      <p:sp>
-        <p:nvSpPr>
-          <p:cNvPr id="50" name="Rounded Rectangle 49">
-            <a:extLst>
-              <a:ext uri="{FF2B5EF4-FFF2-40B4-BE49-F238E27FC236}">
-                <a16:creationId xmlns:a16="http://schemas.microsoft.com/office/drawing/2014/main" id="{67D8E538-D1C2-6CFE-CD74-7687364E4B74}"/>
-              </a:ext>
-            </a:extLst>
-          </p:cNvPr>
-          <p:cNvSpPr/>
-          <p:nvPr/>
-        </p:nvSpPr>
-        <p:spPr>
-          <a:xfrm>
-            <a:off x="5090453" y="2175724"/>
-            <a:ext cx="639048" cy="322544"/>
-          </a:xfrm>
-          <a:prstGeom prst="roundRect">
-            <a:avLst/>
-          </a:prstGeom>
-          <a:solidFill>
-            <a:schemeClr val="accent5">
-              <a:lumMod val="60000"/>
-              <a:lumOff val="40000"/>
-            </a:schemeClr>
-          </a:solidFill>
-          <a:ln w="28575">
-            <a:solidFill>
-              <a:schemeClr val="tx1"/>
-            </a:solidFill>
-          </a:ln>
-        </p:spPr>
-        <p:style>
-          <a:lnRef idx="2">
-            <a:schemeClr val="accent1">
-              <a:shade val="15000"/>
-            </a:schemeClr>
-          </a:lnRef>
-          <a:fillRef idx="1">
-            <a:schemeClr val="accent1"/>
-          </a:fillRef>
-          <a:effectRef idx="0">
-            <a:schemeClr val="accent1"/>
-          </a:effectRef>
-          <a:fontRef idx="minor">
-            <a:schemeClr val="lt1"/>
-          </a:fontRef>
-        </p:style>
-        <p:txBody>
-          <a:bodyPr rtlCol="0" anchor="ctr"/>
-          <a:lstStyle/>
-          <a:p>
-            <a:pPr algn="ctr"/>
-            <a:r>
-              <a:rPr lang="en-US" sz="2000" dirty="0">
-                <a:solidFill>
-                  <a:schemeClr val="tx1"/>
-                </a:solidFill>
-                <a:latin typeface="Consolas" panose="020B0609020204030204" pitchFamily="49" charset="0"/>
-                <a:cs typeface="Consolas" panose="020B0609020204030204" pitchFamily="49" charset="0"/>
-              </a:rPr>
-              <a:t>ast</a:t>
-            </a:r>
-            <a:endParaRPr lang="en-US" sz="3200" dirty="0">
-              <a:solidFill>
-                <a:schemeClr val="tx1"/>
-              </a:solidFill>
-              <a:latin typeface="Consolas" panose="020B0609020204030204" pitchFamily="49" charset="0"/>
-              <a:cs typeface="Consolas" panose="020B0609020204030204" pitchFamily="49" charset="0"/>
-            </a:endParaRPr>
-          </a:p>
-        </p:txBody>
-      </p:sp>
-      <p:cxnSp>
-        <p:nvCxnSpPr>
-          <p:cNvPr id="52" name="Straight Arrow Connector 51">
-            <a:extLst>
-              <a:ext uri="{FF2B5EF4-FFF2-40B4-BE49-F238E27FC236}">
-                <a16:creationId xmlns:a16="http://schemas.microsoft.com/office/drawing/2014/main" id="{C6F308BF-9B7D-F19D-3062-07CE2BF4BDE7}"/>
-              </a:ext>
-            </a:extLst>
-          </p:cNvPr>
-          <p:cNvCxnSpPr>
-            <a:cxnSpLocks/>
-          </p:cNvCxnSpPr>
-          <p:nvPr/>
-        </p:nvCxnSpPr>
-        <p:spPr>
-          <a:xfrm>
-            <a:off x="4824515" y="2317592"/>
-            <a:ext cx="265938" cy="0"/>
-          </a:xfrm>
-          <a:prstGeom prst="straightConnector1">
-            <a:avLst/>
-          </a:prstGeom>
-          <a:ln w="38100">
-            <a:solidFill>
-              <a:schemeClr val="tx1"/>
-            </a:solidFill>
-            <a:tailEnd type="triangle"/>
-          </a:ln>
-        </p:spPr>
-        <p:style>
-          <a:lnRef idx="1">
-            <a:schemeClr val="accent1"/>
-          </a:lnRef>
-          <a:fillRef idx="0">
-            <a:schemeClr val="accent1"/>
-          </a:fillRef>
-          <a:effectRef idx="0">
-            <a:schemeClr val="accent1"/>
-          </a:effectRef>
-          <a:fontRef idx="minor">
-            <a:schemeClr val="tx1"/>
-          </a:fontRef>
-        </p:style>
-      </p:cxnSp>
-      <p:cxnSp>
-        <p:nvCxnSpPr>
-          <p:cNvPr id="66" name="Straight Arrow Connector 65">
-            <a:extLst>
-              <a:ext uri="{FF2B5EF4-FFF2-40B4-BE49-F238E27FC236}">
-                <a16:creationId xmlns:a16="http://schemas.microsoft.com/office/drawing/2014/main" id="{2DD50694-4742-BF9B-5A7D-640F451C7A75}"/>
-              </a:ext>
-            </a:extLst>
-          </p:cNvPr>
-          <p:cNvCxnSpPr>
-            <a:cxnSpLocks/>
-          </p:cNvCxnSpPr>
-          <p:nvPr/>
-        </p:nvCxnSpPr>
-        <p:spPr>
-          <a:xfrm>
-            <a:off x="5739686" y="2317592"/>
-            <a:ext cx="265938" cy="0"/>
-          </a:xfrm>
-          <a:prstGeom prst="straightConnector1">
-            <a:avLst/>
-          </a:prstGeom>
-          <a:ln w="38100">
-            <a:solidFill>
-              <a:schemeClr val="tx1"/>
-            </a:solidFill>
-            <a:tailEnd type="triangle"/>
-          </a:ln>
-        </p:spPr>
-        <p:style>
-          <a:lnRef idx="1">
-            <a:schemeClr val="accent1"/>
-          </a:lnRef>
-          <a:fillRef idx="0">
-            <a:schemeClr val="accent1"/>
-          </a:fillRef>
-          <a:effectRef idx="0">
-            <a:schemeClr val="accent1"/>
-          </a:effectRef>
-          <a:fontRef idx="minor">
-            <a:schemeClr val="tx1"/>
-          </a:fontRef>
-        </p:style>
-      </p:cxnSp>
-      <p:sp>
-        <p:nvSpPr>
-          <p:cNvPr id="5" name="Rounded Rectangle 4">
-            <a:extLst>
-              <a:ext uri="{FF2B5EF4-FFF2-40B4-BE49-F238E27FC236}">
-                <a16:creationId xmlns:a16="http://schemas.microsoft.com/office/drawing/2014/main" id="{9F5DF86F-FECF-B16C-F1E8-EC16E8879996}"/>
-              </a:ext>
-            </a:extLst>
-          </p:cNvPr>
-          <p:cNvSpPr/>
-          <p:nvPr/>
-        </p:nvSpPr>
-        <p:spPr>
-          <a:xfrm>
-            <a:off x="6015783" y="2173854"/>
-            <a:ext cx="1326813" cy="322544"/>
-          </a:xfrm>
-          <a:prstGeom prst="roundRect">
-            <a:avLst/>
-          </a:prstGeom>
-          <a:solidFill>
-            <a:schemeClr val="accent3">
-              <a:lumMod val="60000"/>
-              <a:lumOff val="40000"/>
-            </a:schemeClr>
-          </a:solidFill>
-          <a:ln w="28575">
-            <a:solidFill>
-              <a:schemeClr val="bg2">
-                <a:lumMod val="10000"/>
-              </a:schemeClr>
-            </a:solidFill>
-          </a:ln>
-        </p:spPr>
-        <p:style>
-          <a:lnRef idx="2">
-            <a:schemeClr val="accent1">
-              <a:shade val="15000"/>
-            </a:schemeClr>
-          </a:lnRef>
-          <a:fillRef idx="1">
-            <a:schemeClr val="accent1"/>
-          </a:fillRef>
-          <a:effectRef idx="0">
-            <a:schemeClr val="accent1"/>
-          </a:effectRef>
-          <a:fontRef idx="minor">
-            <a:schemeClr val="lt1"/>
-          </a:fontRef>
-        </p:style>
-        <p:txBody>
-          <a:bodyPr rtlCol="0" anchor="ctr"/>
-          <a:lstStyle/>
-          <a:p>
-            <a:pPr algn="ctr"/>
-            <a:r>
-              <a:rPr lang="en-US" sz="2000" dirty="0">
-                <a:solidFill>
-                  <a:schemeClr val="bg2">
-                    <a:lumMod val="10000"/>
-                  </a:schemeClr>
-                </a:solidFill>
-                <a:latin typeface="Consolas" panose="020B0609020204030204" pitchFamily="49" charset="0"/>
-                <a:cs typeface="Consolas" panose="020B0609020204030204" pitchFamily="49" charset="0"/>
-              </a:rPr>
-              <a:t>While</a:t>
-            </a:r>
-          </a:p>
-        </p:txBody>
-      </p:sp>
-      <p:sp>
-        <p:nvSpPr>
-          <p:cNvPr id="19" name="U-turn Arrow 18">
-            <a:extLst>
-              <a:ext uri="{FF2B5EF4-FFF2-40B4-BE49-F238E27FC236}">
-                <a16:creationId xmlns:a16="http://schemas.microsoft.com/office/drawing/2014/main" id="{B24E477C-AE37-E9A7-49C7-4044813D54C2}"/>
-              </a:ext>
-            </a:extLst>
-          </p:cNvPr>
-          <p:cNvSpPr/>
-          <p:nvPr/>
-        </p:nvSpPr>
-        <p:spPr>
-          <a:xfrm flipH="1">
-            <a:off x="2743200" y="960120"/>
-            <a:ext cx="3950208" cy="1213733"/>
-          </a:xfrm>
-          <a:prstGeom prst="uturnArrow">
-            <a:avLst>
-              <a:gd name="adj1" fmla="val 3843"/>
-              <a:gd name="adj2" fmla="val 6136"/>
-              <a:gd name="adj3" fmla="val 8088"/>
-              <a:gd name="adj4" fmla="val 50000"/>
-              <a:gd name="adj5" fmla="val 26828"/>
-            </a:avLst>
-          </a:prstGeom>
-          <a:solidFill>
-            <a:schemeClr val="tx1"/>
-          </a:solidFill>
-          <a:ln>
-            <a:noFill/>
-          </a:ln>
-        </p:spPr>
-        <p:style>
-          <a:lnRef idx="2">
-            <a:schemeClr val="accent1">
-              <a:shade val="15000"/>
-            </a:schemeClr>
-          </a:lnRef>
-          <a:fillRef idx="1">
-            <a:schemeClr val="accent1"/>
-          </a:fillRef>
-          <a:effectRef idx="0">
-            <a:schemeClr val="accent1"/>
-          </a:effectRef>
-          <a:fontRef idx="minor">
-            <a:schemeClr val="lt1"/>
-          </a:fontRef>
-        </p:style>
-        <p:txBody>
-          <a:bodyPr rtlCol="0" anchor="ctr"/>
-          <a:lstStyle/>
-          <a:p>
-            <a:pPr algn="ctr"/>
-            <a:endParaRPr lang="en-US">
-              <a:solidFill>
-                <a:schemeClr val="tx1"/>
-              </a:solidFill>
-            </a:endParaRPr>
-          </a:p>
-        </p:txBody>
-      </p:sp>
     </p:spTree>
     <p:extLst>
       <p:ext uri="{BB962C8B-B14F-4D97-AF65-F5344CB8AC3E}">

</xml_diff>